<commit_message>
powerpoint picture is modified.
</commit_message>
<xml_diff>
--- a/prj_input/rakurakuInput.pptx
+++ b/prj_input/rakurakuInput.pptx
@@ -19,6 +19,7 @@
     <p:sldId id="268" r:id="rId13"/>
     <p:sldId id="270" r:id="rId14"/>
     <p:sldId id="269" r:id="rId15"/>
+    <p:sldId id="271" r:id="rId16"/>
   </p:sldIdLst>
   <p:sldSz cx="12192000" cy="6858000"/>
   <p:notesSz cx="6858000" cy="9144000"/>
@@ -272,7 +273,7 @@
           <a:p>
             <a:fld id="{1CD75DFC-66AA-4157-91E4-03CC23A492E6}" type="datetimeFigureOut">
               <a:rPr kumimoji="1" lang="ja-JP" altLang="en-US" smtClean="0"/>
-              <a:t>2020/5/8</a:t>
+              <a:t>2020/5/11</a:t>
             </a:fld>
             <a:endParaRPr kumimoji="1" lang="ja-JP" altLang="en-US"/>
           </a:p>
@@ -502,7 +503,7 @@
           <a:p>
             <a:fld id="{1CD75DFC-66AA-4157-91E4-03CC23A492E6}" type="datetimeFigureOut">
               <a:rPr kumimoji="1" lang="ja-JP" altLang="en-US" smtClean="0"/>
-              <a:t>2020/5/8</a:t>
+              <a:t>2020/5/11</a:t>
             </a:fld>
             <a:endParaRPr kumimoji="1" lang="ja-JP" altLang="en-US"/>
           </a:p>
@@ -742,7 +743,7 @@
           <a:p>
             <a:fld id="{1CD75DFC-66AA-4157-91E4-03CC23A492E6}" type="datetimeFigureOut">
               <a:rPr kumimoji="1" lang="ja-JP" altLang="en-US" smtClean="0"/>
-              <a:t>2020/5/8</a:t>
+              <a:t>2020/5/11</a:t>
             </a:fld>
             <a:endParaRPr kumimoji="1" lang="ja-JP" altLang="en-US"/>
           </a:p>
@@ -972,7 +973,7 @@
           <a:p>
             <a:fld id="{1CD75DFC-66AA-4157-91E4-03CC23A492E6}" type="datetimeFigureOut">
               <a:rPr kumimoji="1" lang="ja-JP" altLang="en-US" smtClean="0"/>
-              <a:t>2020/5/8</a:t>
+              <a:t>2020/5/11</a:t>
             </a:fld>
             <a:endParaRPr kumimoji="1" lang="ja-JP" altLang="en-US"/>
           </a:p>
@@ -1247,7 +1248,7 @@
           <a:p>
             <a:fld id="{1CD75DFC-66AA-4157-91E4-03CC23A492E6}" type="datetimeFigureOut">
               <a:rPr kumimoji="1" lang="ja-JP" altLang="en-US" smtClean="0"/>
-              <a:t>2020/5/8</a:t>
+              <a:t>2020/5/11</a:t>
             </a:fld>
             <a:endParaRPr kumimoji="1" lang="ja-JP" altLang="en-US"/>
           </a:p>
@@ -1576,7 +1577,7 @@
           <a:p>
             <a:fld id="{1CD75DFC-66AA-4157-91E4-03CC23A492E6}" type="datetimeFigureOut">
               <a:rPr kumimoji="1" lang="ja-JP" altLang="en-US" smtClean="0"/>
-              <a:t>2020/5/8</a:t>
+              <a:t>2020/5/11</a:t>
             </a:fld>
             <a:endParaRPr kumimoji="1" lang="ja-JP" altLang="en-US"/>
           </a:p>
@@ -2052,7 +2053,7 @@
           <a:p>
             <a:fld id="{1CD75DFC-66AA-4157-91E4-03CC23A492E6}" type="datetimeFigureOut">
               <a:rPr kumimoji="1" lang="ja-JP" altLang="en-US" smtClean="0"/>
-              <a:t>2020/5/8</a:t>
+              <a:t>2020/5/11</a:t>
             </a:fld>
             <a:endParaRPr kumimoji="1" lang="ja-JP" altLang="en-US"/>
           </a:p>
@@ -2193,7 +2194,7 @@
           <a:p>
             <a:fld id="{1CD75DFC-66AA-4157-91E4-03CC23A492E6}" type="datetimeFigureOut">
               <a:rPr kumimoji="1" lang="ja-JP" altLang="en-US" smtClean="0"/>
-              <a:t>2020/5/8</a:t>
+              <a:t>2020/5/11</a:t>
             </a:fld>
             <a:endParaRPr kumimoji="1" lang="ja-JP" altLang="en-US"/>
           </a:p>
@@ -2306,7 +2307,7 @@
           <a:p>
             <a:fld id="{1CD75DFC-66AA-4157-91E4-03CC23A492E6}" type="datetimeFigureOut">
               <a:rPr kumimoji="1" lang="ja-JP" altLang="en-US" smtClean="0"/>
-              <a:t>2020/5/8</a:t>
+              <a:t>2020/5/11</a:t>
             </a:fld>
             <a:endParaRPr kumimoji="1" lang="ja-JP" altLang="en-US"/>
           </a:p>
@@ -2649,7 +2650,7 @@
           <a:p>
             <a:fld id="{1CD75DFC-66AA-4157-91E4-03CC23A492E6}" type="datetimeFigureOut">
               <a:rPr kumimoji="1" lang="ja-JP" altLang="en-US" smtClean="0"/>
-              <a:t>2020/5/8</a:t>
+              <a:t>2020/5/11</a:t>
             </a:fld>
             <a:endParaRPr kumimoji="1" lang="ja-JP" altLang="en-US"/>
           </a:p>
@@ -2937,7 +2938,7 @@
           <a:p>
             <a:fld id="{1CD75DFC-66AA-4157-91E4-03CC23A492E6}" type="datetimeFigureOut">
               <a:rPr kumimoji="1" lang="ja-JP" altLang="en-US" smtClean="0"/>
-              <a:t>2020/5/8</a:t>
+              <a:t>2020/5/11</a:t>
             </a:fld>
             <a:endParaRPr kumimoji="1" lang="ja-JP" altLang="en-US"/>
           </a:p>
@@ -3210,7 +3211,7 @@
           <a:p>
             <a:fld id="{1CD75DFC-66AA-4157-91E4-03CC23A492E6}" type="datetimeFigureOut">
               <a:rPr kumimoji="1" lang="ja-JP" altLang="en-US" smtClean="0"/>
-              <a:t>2020/5/8</a:t>
+              <a:t>2020/5/11</a:t>
             </a:fld>
             <a:endParaRPr kumimoji="1" lang="ja-JP" altLang="en-US"/>
           </a:p>
@@ -7158,10 +7159,875 @@
           <a:chExt cx="0" cy="0"/>
         </a:xfrm>
       </p:grpSpPr>
+      <p:sp>
+        <p:nvSpPr>
+          <p:cNvPr id="2" name="テキスト ボックス 3">
+            <a:extLst>
+              <a:ext uri="{FF2B5EF4-FFF2-40B4-BE49-F238E27FC236}">
+                <a16:creationId xmlns:a16="http://schemas.microsoft.com/office/drawing/2014/main" id="{7238BC4E-C50B-A14F-94DB-1666F600F2C8}"/>
+              </a:ext>
+            </a:extLst>
+          </p:cNvPr>
+          <p:cNvSpPr txBox="1"/>
+          <p:nvPr/>
+        </p:nvSpPr>
+        <p:spPr>
+          <a:xfrm>
+            <a:off x="1927304" y="3044279"/>
+            <a:ext cx="8337391" cy="769441"/>
+          </a:xfrm>
+          <a:prstGeom prst="rect">
+            <a:avLst/>
+          </a:prstGeom>
+          <a:noFill/>
+        </p:spPr>
+        <p:txBody>
+          <a:bodyPr wrap="square" rtlCol="0">
+            <a:spAutoFit/>
+          </a:bodyPr>
+          <a:lstStyle/>
+          <a:p>
+            <a:pPr algn="ctr"/>
+            <a:r>
+              <a:rPr lang="en-US" altLang="ja-JP" sz="4400" dirty="0"/>
+              <a:t>Read and Write Architecture </a:t>
+            </a:r>
+            <a:endParaRPr kumimoji="1" lang="ja-JP" altLang="en-US" sz="4400" dirty="0"/>
+          </a:p>
+        </p:txBody>
+      </p:sp>
     </p:spTree>
     <p:extLst>
       <p:ext uri="{BB962C8B-B14F-4D97-AF65-F5344CB8AC3E}">
         <p14:creationId xmlns:p14="http://schemas.microsoft.com/office/powerpoint/2010/main" val="1386603890"/>
+      </p:ext>
+    </p:extLst>
+  </p:cSld>
+  <p:clrMapOvr>
+    <a:masterClrMapping/>
+  </p:clrMapOvr>
+</p:sld>
+</file>
+
+<file path=ppt/slides/slide15.xml><?xml version="1.0" encoding="utf-8"?>
+<p:sld xmlns:a="http://schemas.openxmlformats.org/drawingml/2006/main" xmlns:r="http://schemas.openxmlformats.org/officeDocument/2006/relationships" xmlns:p="http://schemas.openxmlformats.org/presentationml/2006/main">
+  <p:cSld>
+    <p:spTree>
+      <p:nvGrpSpPr>
+        <p:cNvPr id="1" name=""/>
+        <p:cNvGrpSpPr/>
+        <p:nvPr/>
+      </p:nvGrpSpPr>
+      <p:grpSpPr>
+        <a:xfrm>
+          <a:off x="0" y="0"/>
+          <a:ext cx="0" cy="0"/>
+          <a:chOff x="0" y="0"/>
+          <a:chExt cx="0" cy="0"/>
+        </a:xfrm>
+      </p:grpSpPr>
+      <p:sp>
+        <p:nvSpPr>
+          <p:cNvPr id="4" name="正方形/長方形 21">
+            <a:extLst>
+              <a:ext uri="{FF2B5EF4-FFF2-40B4-BE49-F238E27FC236}">
+                <a16:creationId xmlns:a16="http://schemas.microsoft.com/office/drawing/2014/main" id="{4C276156-EEF8-A046-8B34-9F6398016865}"/>
+              </a:ext>
+            </a:extLst>
+          </p:cNvPr>
+          <p:cNvSpPr/>
+          <p:nvPr/>
+        </p:nvSpPr>
+        <p:spPr>
+          <a:xfrm>
+            <a:off x="7150608" y="252983"/>
+            <a:ext cx="1380055" cy="1524000"/>
+          </a:xfrm>
+          <a:prstGeom prst="rect">
+            <a:avLst/>
+          </a:prstGeom>
+          <a:solidFill>
+            <a:schemeClr val="bg2">
+              <a:lumMod val="90000"/>
+            </a:schemeClr>
+          </a:solidFill>
+          <a:ln>
+            <a:solidFill>
+              <a:schemeClr val="tx1"/>
+            </a:solidFill>
+            <a:prstDash val="solid"/>
+          </a:ln>
+        </p:spPr>
+        <p:style>
+          <a:lnRef idx="2">
+            <a:schemeClr val="accent6"/>
+          </a:lnRef>
+          <a:fillRef idx="1">
+            <a:schemeClr val="lt1"/>
+          </a:fillRef>
+          <a:effectRef idx="0">
+            <a:schemeClr val="accent6"/>
+          </a:effectRef>
+          <a:fontRef idx="minor">
+            <a:schemeClr val="dk1"/>
+          </a:fontRef>
+        </p:style>
+        <p:txBody>
+          <a:bodyPr rtlCol="0" anchor="ctr"/>
+          <a:lstStyle/>
+          <a:p>
+            <a:pPr algn="ctr"/>
+            <a:r>
+              <a:rPr kumimoji="1" lang="en-US" altLang="ja-JP" dirty="0"/>
+              <a:t>Original</a:t>
+            </a:r>
+          </a:p>
+          <a:p>
+            <a:pPr algn="ctr"/>
+            <a:r>
+              <a:rPr lang="en-US" altLang="ja-JP" dirty="0"/>
+              <a:t>Excel File</a:t>
+            </a:r>
+          </a:p>
+        </p:txBody>
+      </p:sp>
+      <p:cxnSp>
+        <p:nvCxnSpPr>
+          <p:cNvPr id="6" name="Straight Arrow Connector 5">
+            <a:extLst>
+              <a:ext uri="{FF2B5EF4-FFF2-40B4-BE49-F238E27FC236}">
+                <a16:creationId xmlns:a16="http://schemas.microsoft.com/office/drawing/2014/main" id="{4740B631-F76E-7D43-A588-4803C9DEE676}"/>
+              </a:ext>
+            </a:extLst>
+          </p:cNvPr>
+          <p:cNvCxnSpPr>
+            <a:cxnSpLocks/>
+            <a:stCxn id="4" idx="1"/>
+            <a:endCxn id="8" idx="3"/>
+          </p:cNvCxnSpPr>
+          <p:nvPr/>
+        </p:nvCxnSpPr>
+        <p:spPr>
+          <a:xfrm flipH="1">
+            <a:off x="4831081" y="1014983"/>
+            <a:ext cx="2319527" cy="762001"/>
+          </a:xfrm>
+          <a:prstGeom prst="straightConnector1">
+            <a:avLst/>
+          </a:prstGeom>
+          <a:ln w="38100" cap="rnd">
+            <a:solidFill>
+              <a:schemeClr val="accent2"/>
+            </a:solidFill>
+            <a:tailEnd type="triangle" w="lg" len="lg"/>
+          </a:ln>
+        </p:spPr>
+        <p:style>
+          <a:lnRef idx="1">
+            <a:schemeClr val="accent1"/>
+          </a:lnRef>
+          <a:fillRef idx="0">
+            <a:schemeClr val="accent1"/>
+          </a:fillRef>
+          <a:effectRef idx="0">
+            <a:schemeClr val="accent1"/>
+          </a:effectRef>
+          <a:fontRef idx="minor">
+            <a:schemeClr val="tx1"/>
+          </a:fontRef>
+        </p:style>
+      </p:cxnSp>
+      <p:sp>
+        <p:nvSpPr>
+          <p:cNvPr id="8" name="Rounded Rectangle 7">
+            <a:extLst>
+              <a:ext uri="{FF2B5EF4-FFF2-40B4-BE49-F238E27FC236}">
+                <a16:creationId xmlns:a16="http://schemas.microsoft.com/office/drawing/2014/main" id="{99865FF3-C4D0-D745-9A5D-DE9401BE3262}"/>
+              </a:ext>
+            </a:extLst>
+          </p:cNvPr>
+          <p:cNvSpPr/>
+          <p:nvPr/>
+        </p:nvSpPr>
+        <p:spPr>
+          <a:xfrm>
+            <a:off x="2502409" y="1106424"/>
+            <a:ext cx="2328672" cy="1341120"/>
+          </a:xfrm>
+          <a:prstGeom prst="roundRect">
+            <a:avLst/>
+          </a:prstGeom>
+          <a:ln>
+            <a:solidFill>
+              <a:schemeClr val="tx1"/>
+            </a:solidFill>
+          </a:ln>
+        </p:spPr>
+        <p:style>
+          <a:lnRef idx="2">
+            <a:schemeClr val="accent6"/>
+          </a:lnRef>
+          <a:fillRef idx="1">
+            <a:schemeClr val="lt1"/>
+          </a:fillRef>
+          <a:effectRef idx="0">
+            <a:schemeClr val="accent6"/>
+          </a:effectRef>
+          <a:fontRef idx="minor">
+            <a:schemeClr val="dk1"/>
+          </a:fontRef>
+        </p:style>
+        <p:txBody>
+          <a:bodyPr rtlCol="0" anchor="ctr"/>
+          <a:lstStyle/>
+          <a:p>
+            <a:pPr algn="ctr"/>
+            <a:r>
+              <a:rPr lang="en-US" dirty="0"/>
+              <a:t>O</a:t>
+            </a:r>
+            <a:r>
+              <a:rPr lang="en-JP" dirty="0"/>
+              <a:t>penpyxl Objects</a:t>
+            </a:r>
+          </a:p>
+          <a:p>
+            <a:pPr algn="ctr"/>
+            <a:r>
+              <a:rPr lang="en-JP" dirty="0"/>
+              <a:t>(ws1)</a:t>
+            </a:r>
+          </a:p>
+        </p:txBody>
+      </p:sp>
+      <p:sp>
+        <p:nvSpPr>
+          <p:cNvPr id="11" name="Rounded Rectangle 10">
+            <a:extLst>
+              <a:ext uri="{FF2B5EF4-FFF2-40B4-BE49-F238E27FC236}">
+                <a16:creationId xmlns:a16="http://schemas.microsoft.com/office/drawing/2014/main" id="{F04717F7-70DB-F54E-B6B0-D19E74358CB8}"/>
+              </a:ext>
+            </a:extLst>
+          </p:cNvPr>
+          <p:cNvSpPr/>
+          <p:nvPr/>
+        </p:nvSpPr>
+        <p:spPr>
+          <a:xfrm>
+            <a:off x="2502409" y="3825734"/>
+            <a:ext cx="2328672" cy="1341120"/>
+          </a:xfrm>
+          <a:prstGeom prst="roundRect">
+            <a:avLst/>
+          </a:prstGeom>
+          <a:ln>
+            <a:solidFill>
+              <a:schemeClr val="tx1"/>
+            </a:solidFill>
+          </a:ln>
+        </p:spPr>
+        <p:style>
+          <a:lnRef idx="2">
+            <a:schemeClr val="accent6"/>
+          </a:lnRef>
+          <a:fillRef idx="1">
+            <a:schemeClr val="lt1"/>
+          </a:fillRef>
+          <a:effectRef idx="0">
+            <a:schemeClr val="accent6"/>
+          </a:effectRef>
+          <a:fontRef idx="minor">
+            <a:schemeClr val="dk1"/>
+          </a:fontRef>
+        </p:style>
+        <p:txBody>
+          <a:bodyPr rtlCol="0" anchor="ctr"/>
+          <a:lstStyle/>
+          <a:p>
+            <a:pPr algn="ctr"/>
+            <a:r>
+              <a:rPr lang="en-JP" dirty="0"/>
+              <a:t>UI Objects</a:t>
+            </a:r>
+          </a:p>
+        </p:txBody>
+      </p:sp>
+      <p:sp>
+        <p:nvSpPr>
+          <p:cNvPr id="18" name="正方形/長方形 21">
+            <a:extLst>
+              <a:ext uri="{FF2B5EF4-FFF2-40B4-BE49-F238E27FC236}">
+                <a16:creationId xmlns:a16="http://schemas.microsoft.com/office/drawing/2014/main" id="{8D4A65D0-8EE4-7949-8C22-130813F3DB30}"/>
+              </a:ext>
+            </a:extLst>
+          </p:cNvPr>
+          <p:cNvSpPr/>
+          <p:nvPr/>
+        </p:nvSpPr>
+        <p:spPr>
+          <a:xfrm>
+            <a:off x="7150608" y="4887428"/>
+            <a:ext cx="1363196" cy="1524000"/>
+          </a:xfrm>
+          <a:prstGeom prst="rect">
+            <a:avLst/>
+          </a:prstGeom>
+          <a:solidFill>
+            <a:schemeClr val="bg2">
+              <a:lumMod val="90000"/>
+            </a:schemeClr>
+          </a:solidFill>
+          <a:ln>
+            <a:solidFill>
+              <a:schemeClr val="tx1"/>
+            </a:solidFill>
+            <a:prstDash val="solid"/>
+          </a:ln>
+        </p:spPr>
+        <p:style>
+          <a:lnRef idx="2">
+            <a:schemeClr val="accent6"/>
+          </a:lnRef>
+          <a:fillRef idx="1">
+            <a:schemeClr val="lt1"/>
+          </a:fillRef>
+          <a:effectRef idx="0">
+            <a:schemeClr val="accent6"/>
+          </a:effectRef>
+          <a:fontRef idx="minor">
+            <a:schemeClr val="dk1"/>
+          </a:fontRef>
+        </p:style>
+        <p:txBody>
+          <a:bodyPr rtlCol="0" anchor="ctr"/>
+          <a:lstStyle/>
+          <a:p>
+            <a:pPr algn="ctr"/>
+            <a:r>
+              <a:rPr lang="en-US" altLang="ja-JP" dirty="0"/>
+              <a:t>Difference</a:t>
+            </a:r>
+          </a:p>
+          <a:p>
+            <a:pPr algn="ctr"/>
+            <a:r>
+              <a:rPr lang="en-US" altLang="ja-JP" dirty="0"/>
+              <a:t>Data</a:t>
+            </a:r>
+          </a:p>
+          <a:p>
+            <a:pPr algn="ctr"/>
+            <a:r>
+              <a:rPr lang="en-US" altLang="ja-JP" dirty="0"/>
+              <a:t>(excel)</a:t>
+            </a:r>
+          </a:p>
+        </p:txBody>
+      </p:sp>
+      <p:cxnSp>
+        <p:nvCxnSpPr>
+          <p:cNvPr id="20" name="Straight Arrow Connector 19">
+            <a:extLst>
+              <a:ext uri="{FF2B5EF4-FFF2-40B4-BE49-F238E27FC236}">
+                <a16:creationId xmlns:a16="http://schemas.microsoft.com/office/drawing/2014/main" id="{42CA6ADF-38D9-4A41-85A4-ED4AA09B1A4D}"/>
+              </a:ext>
+            </a:extLst>
+          </p:cNvPr>
+          <p:cNvCxnSpPr>
+            <a:cxnSpLocks/>
+          </p:cNvCxnSpPr>
+          <p:nvPr/>
+        </p:nvCxnSpPr>
+        <p:spPr>
+          <a:xfrm>
+            <a:off x="3184832" y="2447544"/>
+            <a:ext cx="0" cy="1378190"/>
+          </a:xfrm>
+          <a:prstGeom prst="straightConnector1">
+            <a:avLst/>
+          </a:prstGeom>
+          <a:ln w="38100" cap="rnd">
+            <a:solidFill>
+              <a:schemeClr val="accent1">
+                <a:lumMod val="60000"/>
+                <a:lumOff val="40000"/>
+              </a:schemeClr>
+            </a:solidFill>
+            <a:tailEnd type="triangle" w="lg" len="lg"/>
+          </a:ln>
+        </p:spPr>
+        <p:style>
+          <a:lnRef idx="1">
+            <a:schemeClr val="accent1"/>
+          </a:lnRef>
+          <a:fillRef idx="0">
+            <a:schemeClr val="accent1"/>
+          </a:fillRef>
+          <a:effectRef idx="0">
+            <a:schemeClr val="accent1"/>
+          </a:effectRef>
+          <a:fontRef idx="minor">
+            <a:schemeClr val="tx1"/>
+          </a:fontRef>
+        </p:style>
+      </p:cxnSp>
+      <p:cxnSp>
+        <p:nvCxnSpPr>
+          <p:cNvPr id="23" name="Straight Arrow Connector 22">
+            <a:extLst>
+              <a:ext uri="{FF2B5EF4-FFF2-40B4-BE49-F238E27FC236}">
+                <a16:creationId xmlns:a16="http://schemas.microsoft.com/office/drawing/2014/main" id="{01A9AD67-645D-A24F-8418-A58300AC6D2D}"/>
+              </a:ext>
+            </a:extLst>
+          </p:cNvPr>
+          <p:cNvCxnSpPr>
+            <a:cxnSpLocks/>
+            <a:stCxn id="11" idx="3"/>
+            <a:endCxn id="18" idx="1"/>
+          </p:cNvCxnSpPr>
+          <p:nvPr/>
+        </p:nvCxnSpPr>
+        <p:spPr>
+          <a:xfrm>
+            <a:off x="4831081" y="4496294"/>
+            <a:ext cx="2319527" cy="1153134"/>
+          </a:xfrm>
+          <a:prstGeom prst="straightConnector1">
+            <a:avLst/>
+          </a:prstGeom>
+          <a:ln w="38100" cap="rnd">
+            <a:solidFill>
+              <a:schemeClr val="accent6"/>
+            </a:solidFill>
+            <a:tailEnd type="triangle" w="lg" len="lg"/>
+          </a:ln>
+        </p:spPr>
+        <p:style>
+          <a:lnRef idx="1">
+            <a:schemeClr val="accent1"/>
+          </a:lnRef>
+          <a:fillRef idx="0">
+            <a:schemeClr val="accent1"/>
+          </a:fillRef>
+          <a:effectRef idx="0">
+            <a:schemeClr val="accent1"/>
+          </a:effectRef>
+          <a:fontRef idx="minor">
+            <a:schemeClr val="tx1"/>
+          </a:fontRef>
+        </p:style>
+      </p:cxnSp>
+      <p:cxnSp>
+        <p:nvCxnSpPr>
+          <p:cNvPr id="26" name="Straight Arrow Connector 25">
+            <a:extLst>
+              <a:ext uri="{FF2B5EF4-FFF2-40B4-BE49-F238E27FC236}">
+                <a16:creationId xmlns:a16="http://schemas.microsoft.com/office/drawing/2014/main" id="{4D4BA775-3BCD-CA47-BF3C-56DB76DEF3AE}"/>
+              </a:ext>
+            </a:extLst>
+          </p:cNvPr>
+          <p:cNvCxnSpPr>
+            <a:cxnSpLocks/>
+            <a:stCxn id="18" idx="0"/>
+            <a:endCxn id="57" idx="2"/>
+          </p:cNvCxnSpPr>
+          <p:nvPr/>
+        </p:nvCxnSpPr>
+        <p:spPr>
+          <a:xfrm flipV="1">
+            <a:off x="7832206" y="4085490"/>
+            <a:ext cx="0" cy="801938"/>
+          </a:xfrm>
+          <a:prstGeom prst="straightConnector1">
+            <a:avLst/>
+          </a:prstGeom>
+          <a:ln w="38100" cap="rnd">
+            <a:solidFill>
+              <a:schemeClr val="tx1"/>
+            </a:solidFill>
+            <a:tailEnd type="triangle" w="lg" len="lg"/>
+          </a:ln>
+        </p:spPr>
+        <p:style>
+          <a:lnRef idx="1">
+            <a:schemeClr val="accent1"/>
+          </a:lnRef>
+          <a:fillRef idx="0">
+            <a:schemeClr val="accent1"/>
+          </a:fillRef>
+          <a:effectRef idx="0">
+            <a:schemeClr val="accent1"/>
+          </a:effectRef>
+          <a:fontRef idx="minor">
+            <a:schemeClr val="tx1"/>
+          </a:fontRef>
+        </p:style>
+      </p:cxnSp>
+      <p:sp>
+        <p:nvSpPr>
+          <p:cNvPr id="29" name="TextBox 28">
+            <a:extLst>
+              <a:ext uri="{FF2B5EF4-FFF2-40B4-BE49-F238E27FC236}">
+                <a16:creationId xmlns:a16="http://schemas.microsoft.com/office/drawing/2014/main" id="{EED90E5B-4F5F-2D40-ACD0-AA5713B3C45C}"/>
+              </a:ext>
+            </a:extLst>
+          </p:cNvPr>
+          <p:cNvSpPr txBox="1"/>
+          <p:nvPr/>
+        </p:nvSpPr>
+        <p:spPr>
+          <a:xfrm>
+            <a:off x="5481138" y="1628651"/>
+            <a:ext cx="1380055" cy="523220"/>
+          </a:xfrm>
+          <a:prstGeom prst="rect">
+            <a:avLst/>
+          </a:prstGeom>
+          <a:noFill/>
+        </p:spPr>
+        <p:txBody>
+          <a:bodyPr wrap="square" rtlCol="0">
+            <a:spAutoFit/>
+          </a:bodyPr>
+          <a:lstStyle/>
+          <a:p>
+            <a:r>
+              <a:rPr lang="en-JP" sz="2800" dirty="0">
+                <a:solidFill>
+                  <a:schemeClr val="accent2"/>
+                </a:solidFill>
+              </a:rPr>
+              <a:t>Read</a:t>
+            </a:r>
+          </a:p>
+        </p:txBody>
+      </p:sp>
+      <p:sp>
+        <p:nvSpPr>
+          <p:cNvPr id="32" name="TextBox 31">
+            <a:extLst>
+              <a:ext uri="{FF2B5EF4-FFF2-40B4-BE49-F238E27FC236}">
+                <a16:creationId xmlns:a16="http://schemas.microsoft.com/office/drawing/2014/main" id="{49BAA8E4-4801-6D4F-81C7-E0B4441DE936}"/>
+              </a:ext>
+            </a:extLst>
+          </p:cNvPr>
+          <p:cNvSpPr txBox="1"/>
+          <p:nvPr/>
+        </p:nvSpPr>
+        <p:spPr>
+          <a:xfrm>
+            <a:off x="1010839" y="2863334"/>
+            <a:ext cx="2173993" cy="369332"/>
+          </a:xfrm>
+          <a:prstGeom prst="rect">
+            <a:avLst/>
+          </a:prstGeom>
+          <a:noFill/>
+        </p:spPr>
+        <p:txBody>
+          <a:bodyPr wrap="none" rtlCol="0">
+            <a:spAutoFit/>
+          </a:bodyPr>
+          <a:lstStyle/>
+          <a:p>
+            <a:r>
+              <a:rPr lang="en-US" dirty="0">
+                <a:solidFill>
+                  <a:schemeClr val="accent1">
+                    <a:lumMod val="60000"/>
+                    <a:lumOff val="40000"/>
+                  </a:schemeClr>
+                </a:solidFill>
+              </a:rPr>
+              <a:t>R</a:t>
+            </a:r>
+            <a:r>
+              <a:rPr lang="en-JP" dirty="0">
+                <a:solidFill>
+                  <a:schemeClr val="accent1">
+                    <a:lumMod val="60000"/>
+                    <a:lumOff val="40000"/>
+                  </a:schemeClr>
+                </a:solidFill>
+              </a:rPr>
+              <a:t>ead one line data</a:t>
+            </a:r>
+          </a:p>
+        </p:txBody>
+      </p:sp>
+      <p:cxnSp>
+        <p:nvCxnSpPr>
+          <p:cNvPr id="35" name="Straight Arrow Connector 34">
+            <a:extLst>
+              <a:ext uri="{FF2B5EF4-FFF2-40B4-BE49-F238E27FC236}">
+                <a16:creationId xmlns:a16="http://schemas.microsoft.com/office/drawing/2014/main" id="{56C72D2F-FCA1-6B48-B1AE-E8F1CC055B97}"/>
+              </a:ext>
+            </a:extLst>
+          </p:cNvPr>
+          <p:cNvCxnSpPr>
+            <a:cxnSpLocks/>
+          </p:cNvCxnSpPr>
+          <p:nvPr/>
+        </p:nvCxnSpPr>
+        <p:spPr>
+          <a:xfrm flipV="1">
+            <a:off x="4250724" y="2447544"/>
+            <a:ext cx="0" cy="1378190"/>
+          </a:xfrm>
+          <a:prstGeom prst="straightConnector1">
+            <a:avLst/>
+          </a:prstGeom>
+          <a:ln w="38100" cap="rnd">
+            <a:solidFill>
+              <a:schemeClr val="accent6"/>
+            </a:solidFill>
+            <a:tailEnd type="triangle" w="lg" len="lg"/>
+          </a:ln>
+        </p:spPr>
+        <p:style>
+          <a:lnRef idx="1">
+            <a:schemeClr val="accent1"/>
+          </a:lnRef>
+          <a:fillRef idx="0">
+            <a:schemeClr val="accent1"/>
+          </a:fillRef>
+          <a:effectRef idx="0">
+            <a:schemeClr val="accent1"/>
+          </a:effectRef>
+          <a:fontRef idx="minor">
+            <a:schemeClr val="tx1"/>
+          </a:fontRef>
+        </p:style>
+      </p:cxnSp>
+      <p:sp>
+        <p:nvSpPr>
+          <p:cNvPr id="38" name="TextBox 37">
+            <a:extLst>
+              <a:ext uri="{FF2B5EF4-FFF2-40B4-BE49-F238E27FC236}">
+                <a16:creationId xmlns:a16="http://schemas.microsoft.com/office/drawing/2014/main" id="{8D25A14B-04D1-4A4F-96F4-8E4E639A2800}"/>
+              </a:ext>
+            </a:extLst>
+          </p:cNvPr>
+          <p:cNvSpPr txBox="1"/>
+          <p:nvPr/>
+        </p:nvSpPr>
+        <p:spPr>
+          <a:xfrm>
+            <a:off x="4668798" y="3414930"/>
+            <a:ext cx="1380055" cy="523220"/>
+          </a:xfrm>
+          <a:prstGeom prst="rect">
+            <a:avLst/>
+          </a:prstGeom>
+          <a:noFill/>
+        </p:spPr>
+        <p:txBody>
+          <a:bodyPr wrap="square" rtlCol="0">
+            <a:spAutoFit/>
+          </a:bodyPr>
+          <a:lstStyle/>
+          <a:p>
+            <a:r>
+              <a:rPr lang="en-JP" sz="2800" dirty="0">
+                <a:solidFill>
+                  <a:schemeClr val="accent6"/>
+                </a:solidFill>
+              </a:rPr>
+              <a:t>Write</a:t>
+            </a:r>
+          </a:p>
+        </p:txBody>
+      </p:sp>
+      <p:sp>
+        <p:nvSpPr>
+          <p:cNvPr id="57" name="Rounded Rectangle 56">
+            <a:extLst>
+              <a:ext uri="{FF2B5EF4-FFF2-40B4-BE49-F238E27FC236}">
+                <a16:creationId xmlns:a16="http://schemas.microsoft.com/office/drawing/2014/main" id="{C4C6F1E3-5517-5341-84AA-E165B1A5C871}"/>
+              </a:ext>
+            </a:extLst>
+          </p:cNvPr>
+          <p:cNvSpPr/>
+          <p:nvPr/>
+        </p:nvSpPr>
+        <p:spPr>
+          <a:xfrm>
+            <a:off x="6672443" y="2744370"/>
+            <a:ext cx="2319526" cy="1341120"/>
+          </a:xfrm>
+          <a:prstGeom prst="roundRect">
+            <a:avLst/>
+          </a:prstGeom>
+          <a:ln>
+            <a:solidFill>
+              <a:schemeClr val="tx1"/>
+            </a:solidFill>
+          </a:ln>
+        </p:spPr>
+        <p:style>
+          <a:lnRef idx="2">
+            <a:schemeClr val="accent6"/>
+          </a:lnRef>
+          <a:fillRef idx="1">
+            <a:schemeClr val="lt1"/>
+          </a:fillRef>
+          <a:effectRef idx="0">
+            <a:schemeClr val="accent6"/>
+          </a:effectRef>
+          <a:fontRef idx="minor">
+            <a:schemeClr val="dk1"/>
+          </a:fontRef>
+        </p:style>
+        <p:txBody>
+          <a:bodyPr rtlCol="0" anchor="ctr"/>
+          <a:lstStyle/>
+          <a:p>
+            <a:pPr algn="ctr"/>
+            <a:r>
+              <a:rPr lang="en-US" dirty="0"/>
+              <a:t>O</a:t>
+            </a:r>
+            <a:r>
+              <a:rPr lang="en-JP" dirty="0"/>
+              <a:t>penpyxl Objects</a:t>
+            </a:r>
+          </a:p>
+          <a:p>
+            <a:pPr algn="ctr"/>
+            <a:r>
+              <a:rPr lang="en-JP" dirty="0"/>
+              <a:t>(wsBase)</a:t>
+            </a:r>
+          </a:p>
+        </p:txBody>
+      </p:sp>
+      <p:cxnSp>
+        <p:nvCxnSpPr>
+          <p:cNvPr id="60" name="Straight Arrow Connector 59">
+            <a:extLst>
+              <a:ext uri="{FF2B5EF4-FFF2-40B4-BE49-F238E27FC236}">
+                <a16:creationId xmlns:a16="http://schemas.microsoft.com/office/drawing/2014/main" id="{DEBA80FC-5F29-1A4D-90B5-EC06A4609093}"/>
+              </a:ext>
+            </a:extLst>
+          </p:cNvPr>
+          <p:cNvCxnSpPr>
+            <a:cxnSpLocks/>
+          </p:cNvCxnSpPr>
+          <p:nvPr/>
+        </p:nvCxnSpPr>
+        <p:spPr>
+          <a:xfrm flipV="1">
+            <a:off x="8124841" y="1776984"/>
+            <a:ext cx="0" cy="967386"/>
+          </a:xfrm>
+          <a:prstGeom prst="straightConnector1">
+            <a:avLst/>
+          </a:prstGeom>
+          <a:ln w="38100" cap="rnd">
+            <a:solidFill>
+              <a:schemeClr val="tx1"/>
+            </a:solidFill>
+            <a:tailEnd type="triangle" w="lg" len="lg"/>
+          </a:ln>
+        </p:spPr>
+        <p:style>
+          <a:lnRef idx="1">
+            <a:schemeClr val="accent1"/>
+          </a:lnRef>
+          <a:fillRef idx="0">
+            <a:schemeClr val="accent1"/>
+          </a:fillRef>
+          <a:effectRef idx="0">
+            <a:schemeClr val="accent1"/>
+          </a:effectRef>
+          <a:fontRef idx="minor">
+            <a:schemeClr val="tx1"/>
+          </a:fontRef>
+        </p:style>
+      </p:cxnSp>
+      <p:cxnSp>
+        <p:nvCxnSpPr>
+          <p:cNvPr id="64" name="Straight Arrow Connector 63">
+            <a:extLst>
+              <a:ext uri="{FF2B5EF4-FFF2-40B4-BE49-F238E27FC236}">
+                <a16:creationId xmlns:a16="http://schemas.microsoft.com/office/drawing/2014/main" id="{20F3C646-72E6-FD4C-A389-7AFBA927F444}"/>
+              </a:ext>
+            </a:extLst>
+          </p:cNvPr>
+          <p:cNvCxnSpPr>
+            <a:cxnSpLocks/>
+          </p:cNvCxnSpPr>
+          <p:nvPr/>
+        </p:nvCxnSpPr>
+        <p:spPr>
+          <a:xfrm>
+            <a:off x="7522210" y="1809149"/>
+            <a:ext cx="0" cy="935221"/>
+          </a:xfrm>
+          <a:prstGeom prst="straightConnector1">
+            <a:avLst/>
+          </a:prstGeom>
+          <a:ln w="38100" cap="rnd">
+            <a:solidFill>
+              <a:schemeClr val="accent2"/>
+            </a:solidFill>
+            <a:tailEnd type="triangle" w="lg" len="lg"/>
+          </a:ln>
+        </p:spPr>
+        <p:style>
+          <a:lnRef idx="1">
+            <a:schemeClr val="accent1"/>
+          </a:lnRef>
+          <a:fillRef idx="0">
+            <a:schemeClr val="accent1"/>
+          </a:fillRef>
+          <a:effectRef idx="0">
+            <a:schemeClr val="accent1"/>
+          </a:effectRef>
+          <a:fontRef idx="minor">
+            <a:schemeClr val="tx1"/>
+          </a:fontRef>
+        </p:style>
+      </p:cxnSp>
+      <p:sp>
+        <p:nvSpPr>
+          <p:cNvPr id="69" name="TextBox 68">
+            <a:extLst>
+              <a:ext uri="{FF2B5EF4-FFF2-40B4-BE49-F238E27FC236}">
+                <a16:creationId xmlns:a16="http://schemas.microsoft.com/office/drawing/2014/main" id="{61B53850-04D5-5942-9958-461475299441}"/>
+              </a:ext>
+            </a:extLst>
+          </p:cNvPr>
+          <p:cNvSpPr txBox="1"/>
+          <p:nvPr/>
+        </p:nvSpPr>
+        <p:spPr>
+          <a:xfrm>
+            <a:off x="9354065" y="3167390"/>
+            <a:ext cx="986167" cy="523220"/>
+          </a:xfrm>
+          <a:prstGeom prst="rect">
+            <a:avLst/>
+          </a:prstGeom>
+          <a:noFill/>
+        </p:spPr>
+        <p:txBody>
+          <a:bodyPr wrap="none" rtlCol="0">
+            <a:spAutoFit/>
+          </a:bodyPr>
+          <a:lstStyle/>
+          <a:p>
+            <a:r>
+              <a:rPr lang="en-JP" sz="2800" dirty="0"/>
+              <a:t>Save</a:t>
+            </a:r>
+          </a:p>
+        </p:txBody>
+      </p:sp>
+    </p:spTree>
+    <p:extLst>
+      <p:ext uri="{BB962C8B-B14F-4D97-AF65-F5344CB8AC3E}">
+        <p14:creationId xmlns:p14="http://schemas.microsoft.com/office/powerpoint/2010/main" val="929313866"/>
       </p:ext>
     </p:extLst>
   </p:cSld>

</xml_diff>